<commit_message>
graph detail on presentation
</commit_message>
<xml_diff>
--- a/presentation/Long Presentation.pptx
+++ b/presentation/Long Presentation.pptx
@@ -269,7 +269,7 @@
           <a:p>
             <a:fld id="{4A05C880-6E7A-46CE-A165-4FC6F737E1CB}" type="datetimeFigureOut">
               <a:rPr lang="es-ES" smtClean="0"/>
-              <a:t>27/10/2024</a:t>
+              <a:t>29/10/2024</a:t>
             </a:fld>
             <a:endParaRPr lang="es-ES"/>
           </a:p>
@@ -439,7 +439,7 @@
           <a:p>
             <a:fld id="{4A05C880-6E7A-46CE-A165-4FC6F737E1CB}" type="datetimeFigureOut">
               <a:rPr lang="es-ES" smtClean="0"/>
-              <a:t>27/10/2024</a:t>
+              <a:t>29/10/2024</a:t>
             </a:fld>
             <a:endParaRPr lang="es-ES"/>
           </a:p>
@@ -619,7 +619,7 @@
           <a:p>
             <a:fld id="{4A05C880-6E7A-46CE-A165-4FC6F737E1CB}" type="datetimeFigureOut">
               <a:rPr lang="es-ES" smtClean="0"/>
-              <a:t>27/10/2024</a:t>
+              <a:t>29/10/2024</a:t>
             </a:fld>
             <a:endParaRPr lang="es-ES"/>
           </a:p>
@@ -789,7 +789,7 @@
           <a:p>
             <a:fld id="{4A05C880-6E7A-46CE-A165-4FC6F737E1CB}" type="datetimeFigureOut">
               <a:rPr lang="es-ES" smtClean="0"/>
-              <a:t>27/10/2024</a:t>
+              <a:t>29/10/2024</a:t>
             </a:fld>
             <a:endParaRPr lang="es-ES"/>
           </a:p>
@@ -1035,7 +1035,7 @@
           <a:p>
             <a:fld id="{4A05C880-6E7A-46CE-A165-4FC6F737E1CB}" type="datetimeFigureOut">
               <a:rPr lang="es-ES" smtClean="0"/>
-              <a:t>27/10/2024</a:t>
+              <a:t>29/10/2024</a:t>
             </a:fld>
             <a:endParaRPr lang="es-ES"/>
           </a:p>
@@ -1267,7 +1267,7 @@
           <a:p>
             <a:fld id="{4A05C880-6E7A-46CE-A165-4FC6F737E1CB}" type="datetimeFigureOut">
               <a:rPr lang="es-ES" smtClean="0"/>
-              <a:t>27/10/2024</a:t>
+              <a:t>29/10/2024</a:t>
             </a:fld>
             <a:endParaRPr lang="es-ES"/>
           </a:p>
@@ -1634,7 +1634,7 @@
           <a:p>
             <a:fld id="{4A05C880-6E7A-46CE-A165-4FC6F737E1CB}" type="datetimeFigureOut">
               <a:rPr lang="es-ES" smtClean="0"/>
-              <a:t>27/10/2024</a:t>
+              <a:t>29/10/2024</a:t>
             </a:fld>
             <a:endParaRPr lang="es-ES"/>
           </a:p>
@@ -1752,7 +1752,7 @@
           <a:p>
             <a:fld id="{4A05C880-6E7A-46CE-A165-4FC6F737E1CB}" type="datetimeFigureOut">
               <a:rPr lang="es-ES" smtClean="0"/>
-              <a:t>27/10/2024</a:t>
+              <a:t>29/10/2024</a:t>
             </a:fld>
             <a:endParaRPr lang="es-ES"/>
           </a:p>
@@ -1847,7 +1847,7 @@
           <a:p>
             <a:fld id="{4A05C880-6E7A-46CE-A165-4FC6F737E1CB}" type="datetimeFigureOut">
               <a:rPr lang="es-ES" smtClean="0"/>
-              <a:t>27/10/2024</a:t>
+              <a:t>29/10/2024</a:t>
             </a:fld>
             <a:endParaRPr lang="es-ES"/>
           </a:p>
@@ -2124,7 +2124,7 @@
           <a:p>
             <a:fld id="{4A05C880-6E7A-46CE-A165-4FC6F737E1CB}" type="datetimeFigureOut">
               <a:rPr lang="es-ES" smtClean="0"/>
-              <a:t>27/10/2024</a:t>
+              <a:t>29/10/2024</a:t>
             </a:fld>
             <a:endParaRPr lang="es-ES"/>
           </a:p>
@@ -2377,7 +2377,7 @@
           <a:p>
             <a:fld id="{4A05C880-6E7A-46CE-A165-4FC6F737E1CB}" type="datetimeFigureOut">
               <a:rPr lang="es-ES" smtClean="0"/>
-              <a:t>27/10/2024</a:t>
+              <a:t>29/10/2024</a:t>
             </a:fld>
             <a:endParaRPr lang="es-ES"/>
           </a:p>
@@ -2590,7 +2590,7 @@
           <a:p>
             <a:fld id="{4A05C880-6E7A-46CE-A165-4FC6F737E1CB}" type="datetimeFigureOut">
               <a:rPr lang="es-ES" smtClean="0"/>
-              <a:t>27/10/2024</a:t>
+              <a:t>29/10/2024</a:t>
             </a:fld>
             <a:endParaRPr lang="es-ES"/>
           </a:p>
@@ -4570,7 +4570,7 @@
       </p:sp>
       <p:pic>
         <p:nvPicPr>
-          <p:cNvPr id="4" name="Marcador de contenido 3"/>
+          <p:cNvPr id="5" name="Marcador de contenido 4"/>
           <p:cNvPicPr>
             <a:picLocks noGrp="1" noChangeAspect="1"/>
           </p:cNvPicPr>
@@ -4592,8 +4592,8 @@
         </p:blipFill>
         <p:spPr>
           <a:xfrm>
-            <a:off x="136479" y="1063852"/>
-            <a:ext cx="11900846" cy="5865915"/>
+            <a:off x="354842" y="1251875"/>
+            <a:ext cx="11837158" cy="5668770"/>
           </a:xfrm>
         </p:spPr>
       </p:pic>
@@ -4677,7 +4677,7 @@
       </p:sp>
       <p:pic>
         <p:nvPicPr>
-          <p:cNvPr id="4" name="Marcador de contenido 3"/>
+          <p:cNvPr id="5" name="Marcador de contenido 4"/>
           <p:cNvPicPr>
             <a:picLocks noGrp="1" noChangeAspect="1"/>
           </p:cNvPicPr>
@@ -4699,8 +4699,8 @@
         </p:blipFill>
         <p:spPr>
           <a:xfrm>
-            <a:off x="464024" y="1225299"/>
-            <a:ext cx="11546005" cy="5691014"/>
+            <a:off x="376481" y="1293275"/>
+            <a:ext cx="11619901" cy="5564726"/>
           </a:xfrm>
         </p:spPr>
       </p:pic>
@@ -5077,32 +5077,19 @@
           <a:p>
             <a:r>
               <a:rPr lang="es-ES" dirty="0" smtClean="0"/>
-              <a:t>Su canto característico (Colín) consiste en una señal que tiene 2 </a:t>
-            </a:r>
-            <a:r>
-              <a:rPr lang="es-ES" dirty="0" smtClean="0"/>
-              <a:t>momentos:</a:t>
-            </a:r>
-            <a:endParaRPr lang="es-ES" dirty="0" smtClean="0"/>
-          </a:p>
-          <a:p>
-            <a:r>
-              <a:rPr lang="es-ES" dirty="0" smtClean="0"/>
-              <a:t>Un </a:t>
-            </a:r>
-            <a:r>
-              <a:rPr lang="es-ES" dirty="0" smtClean="0"/>
-              <a:t>momento de baja frecuencia (CO).</a:t>
-            </a:r>
-          </a:p>
-          <a:p>
-            <a:r>
-              <a:rPr lang="es-ES" dirty="0" smtClean="0"/>
-              <a:t>Un momento de alta frecuencia (LIN</a:t>
-            </a:r>
-            <a:r>
-              <a:rPr lang="es-ES" dirty="0" smtClean="0"/>
-              <a:t>).</a:t>
+              <a:t>Su canto característico (Colín) consiste en una señal que tiene 2 momentos:</a:t>
+            </a:r>
+          </a:p>
+          <a:p>
+            <a:r>
+              <a:rPr lang="es-ES" dirty="0" smtClean="0"/>
+              <a:t>Un momento de baja frecuencia (CO).</a:t>
+            </a:r>
+          </a:p>
+          <a:p>
+            <a:r>
+              <a:rPr lang="es-ES" dirty="0" smtClean="0"/>
+              <a:t>Un momento de alta frecuencia (LIN).</a:t>
             </a:r>
           </a:p>
           <a:p>
@@ -5110,7 +5097,6 @@
               <a:rPr lang="es-ES" dirty="0" smtClean="0"/>
               <a:t>Ejemplo de sonido producido: </a:t>
             </a:r>
-            <a:endParaRPr lang="es-ES" dirty="0" smtClean="0"/>
           </a:p>
           <a:p>
             <a:endParaRPr lang="es-ES" dirty="0"/>
@@ -7237,11 +7223,7 @@
           <a:p>
             <a:r>
               <a:rPr lang="es-ES" dirty="0" smtClean="0"/>
-              <a:t>Análisis de causalidad</a:t>
-            </a:r>
-            <a:r>
-              <a:rPr lang="es-ES" dirty="0" smtClean="0"/>
-              <a:t>.</a:t>
+              <a:t>Análisis de causalidad.</a:t>
             </a:r>
           </a:p>
           <a:p>
@@ -7255,7 +7237,6 @@
               <a:rPr lang="es-ES" dirty="0" smtClean="0"/>
               <a:t>Obtener estadísticas que aporten contundencia y rigurosidad a los resultados.</a:t>
             </a:r>
-            <a:endParaRPr lang="es-ES" dirty="0" smtClean="0"/>
           </a:p>
           <a:p>
             <a:endParaRPr lang="es-ES" dirty="0"/>

</xml_diff>